<commit_message>
Changes for jpeg image for physical framework of bot
</commit_message>
<xml_diff>
--- a/Suspended_Robot/String_coordinate_representation_work.pptx
+++ b/Suspended_Robot/String_coordinate_representation_work.pptx
@@ -104,6 +104,11 @@
       </a:defRPr>
     </a:lvl9pPr>
   </p:defaultTextStyle>
+  <p:extLst>
+    <p:ext uri="{EFAFB233-063F-42B5-8137-9DF3F51BA10A}">
+      <p15:sldGuideLst xmlns:p15="http://schemas.microsoft.com/office/powerpoint/2012/main"/>
+    </p:ext>
+  </p:extLst>
 </p:presentation>
 </file>
 
@@ -238,7 +243,7 @@
           <a:p>
             <a:fld id="{C483B177-E141-4194-BD34-C8E460AFEB25}" type="datetimeFigureOut">
               <a:rPr lang="en-US" smtClean="0"/>
-              <a:t>21-Aug-19</a:t>
+              <a:t>08-Sep-19</a:t>
             </a:fld>
             <a:endParaRPr lang="en-US"/>
           </a:p>
@@ -408,7 +413,7 @@
           <a:p>
             <a:fld id="{C483B177-E141-4194-BD34-C8E460AFEB25}" type="datetimeFigureOut">
               <a:rPr lang="en-US" smtClean="0"/>
-              <a:t>21-Aug-19</a:t>
+              <a:t>08-Sep-19</a:t>
             </a:fld>
             <a:endParaRPr lang="en-US"/>
           </a:p>
@@ -588,7 +593,7 @@
           <a:p>
             <a:fld id="{C483B177-E141-4194-BD34-C8E460AFEB25}" type="datetimeFigureOut">
               <a:rPr lang="en-US" smtClean="0"/>
-              <a:t>21-Aug-19</a:t>
+              <a:t>08-Sep-19</a:t>
             </a:fld>
             <a:endParaRPr lang="en-US"/>
           </a:p>
@@ -758,7 +763,7 @@
           <a:p>
             <a:fld id="{C483B177-E141-4194-BD34-C8E460AFEB25}" type="datetimeFigureOut">
               <a:rPr lang="en-US" smtClean="0"/>
-              <a:t>21-Aug-19</a:t>
+              <a:t>08-Sep-19</a:t>
             </a:fld>
             <a:endParaRPr lang="en-US"/>
           </a:p>
@@ -1004,7 +1009,7 @@
           <a:p>
             <a:fld id="{C483B177-E141-4194-BD34-C8E460AFEB25}" type="datetimeFigureOut">
               <a:rPr lang="en-US" smtClean="0"/>
-              <a:t>21-Aug-19</a:t>
+              <a:t>08-Sep-19</a:t>
             </a:fld>
             <a:endParaRPr lang="en-US"/>
           </a:p>
@@ -1236,7 +1241,7 @@
           <a:p>
             <a:fld id="{C483B177-E141-4194-BD34-C8E460AFEB25}" type="datetimeFigureOut">
               <a:rPr lang="en-US" smtClean="0"/>
-              <a:t>21-Aug-19</a:t>
+              <a:t>08-Sep-19</a:t>
             </a:fld>
             <a:endParaRPr lang="en-US"/>
           </a:p>
@@ -1603,7 +1608,7 @@
           <a:p>
             <a:fld id="{C483B177-E141-4194-BD34-C8E460AFEB25}" type="datetimeFigureOut">
               <a:rPr lang="en-US" smtClean="0"/>
-              <a:t>21-Aug-19</a:t>
+              <a:t>08-Sep-19</a:t>
             </a:fld>
             <a:endParaRPr lang="en-US"/>
           </a:p>
@@ -1721,7 +1726,7 @@
           <a:p>
             <a:fld id="{C483B177-E141-4194-BD34-C8E460AFEB25}" type="datetimeFigureOut">
               <a:rPr lang="en-US" smtClean="0"/>
-              <a:t>21-Aug-19</a:t>
+              <a:t>08-Sep-19</a:t>
             </a:fld>
             <a:endParaRPr lang="en-US"/>
           </a:p>
@@ -1816,7 +1821,7 @@
           <a:p>
             <a:fld id="{C483B177-E141-4194-BD34-C8E460AFEB25}" type="datetimeFigureOut">
               <a:rPr lang="en-US" smtClean="0"/>
-              <a:t>21-Aug-19</a:t>
+              <a:t>08-Sep-19</a:t>
             </a:fld>
             <a:endParaRPr lang="en-US"/>
           </a:p>
@@ -2093,7 +2098,7 @@
           <a:p>
             <a:fld id="{C483B177-E141-4194-BD34-C8E460AFEB25}" type="datetimeFigureOut">
               <a:rPr lang="en-US" smtClean="0"/>
-              <a:t>21-Aug-19</a:t>
+              <a:t>08-Sep-19</a:t>
             </a:fld>
             <a:endParaRPr lang="en-US"/>
           </a:p>
@@ -2346,7 +2351,7 @@
           <a:p>
             <a:fld id="{C483B177-E141-4194-BD34-C8E460AFEB25}" type="datetimeFigureOut">
               <a:rPr lang="en-US" smtClean="0"/>
-              <a:t>21-Aug-19</a:t>
+              <a:t>08-Sep-19</a:t>
             </a:fld>
             <a:endParaRPr lang="en-US"/>
           </a:p>
@@ -2559,7 +2564,7 @@
           <a:p>
             <a:fld id="{C483B177-E141-4194-BD34-C8E460AFEB25}" type="datetimeFigureOut">
               <a:rPr lang="en-US" smtClean="0"/>
-              <a:t>21-Aug-19</a:t>
+              <a:t>08-Sep-19</a:t>
             </a:fld>
             <a:endParaRPr lang="en-US"/>
           </a:p>
@@ -4536,6 +4541,577 @@
           </a:p>
         </p:txBody>
       </p:sp>
+      <p:sp>
+        <p:nvSpPr>
+          <p:cNvPr id="2" name="TextBox 1"/>
+          <p:cNvSpPr txBox="1"/>
+          <p:nvPr/>
+        </p:nvSpPr>
+        <p:spPr>
+          <a:xfrm>
+            <a:off x="4213341" y="2415658"/>
+            <a:ext cx="520700" cy="369332"/>
+          </a:xfrm>
+          <a:prstGeom prst="rect">
+            <a:avLst/>
+          </a:prstGeom>
+          <a:noFill/>
+          <a:ln>
+            <a:noFill/>
+          </a:ln>
+        </p:spPr>
+        <p:txBody>
+          <a:bodyPr wrap="square" rtlCol="0">
+            <a:spAutoFit/>
+          </a:bodyPr>
+          <a:lstStyle/>
+          <a:p>
+            <a:r>
+              <a:rPr lang="en-US" b="1" dirty="0" smtClean="0"/>
+              <a:t>L</a:t>
+            </a:r>
+            <a:r>
+              <a:rPr lang="en-US" b="1" baseline="-25000" dirty="0" smtClean="0"/>
+              <a:t>1</a:t>
+            </a:r>
+            <a:endParaRPr lang="en-US" b="1" baseline="-25000" dirty="0"/>
+          </a:p>
+        </p:txBody>
+      </p:sp>
+      <p:sp>
+        <p:nvSpPr>
+          <p:cNvPr id="53" name="TextBox 52"/>
+          <p:cNvSpPr txBox="1"/>
+          <p:nvPr/>
+        </p:nvSpPr>
+        <p:spPr>
+          <a:xfrm>
+            <a:off x="5382104" y="1854721"/>
+            <a:ext cx="520700" cy="369332"/>
+          </a:xfrm>
+          <a:prstGeom prst="rect">
+            <a:avLst/>
+          </a:prstGeom>
+          <a:noFill/>
+          <a:ln>
+            <a:noFill/>
+          </a:ln>
+        </p:spPr>
+        <p:txBody>
+          <a:bodyPr wrap="square" rtlCol="0">
+            <a:spAutoFit/>
+          </a:bodyPr>
+          <a:lstStyle/>
+          <a:p>
+            <a:r>
+              <a:rPr lang="en-US" b="1" dirty="0" smtClean="0"/>
+              <a:t>L</a:t>
+            </a:r>
+            <a:r>
+              <a:rPr lang="en-US" b="1" baseline="-25000" dirty="0" smtClean="0"/>
+              <a:t>2</a:t>
+            </a:r>
+            <a:endParaRPr lang="en-US" b="1" baseline="-25000" dirty="0"/>
+          </a:p>
+        </p:txBody>
+      </p:sp>
+      <p:sp>
+        <p:nvSpPr>
+          <p:cNvPr id="56" name="TextBox 55"/>
+          <p:cNvSpPr txBox="1"/>
+          <p:nvPr/>
+        </p:nvSpPr>
+        <p:spPr>
+          <a:xfrm>
+            <a:off x="6969677" y="1565079"/>
+            <a:ext cx="520700" cy="369332"/>
+          </a:xfrm>
+          <a:prstGeom prst="rect">
+            <a:avLst/>
+          </a:prstGeom>
+          <a:noFill/>
+          <a:ln>
+            <a:noFill/>
+          </a:ln>
+        </p:spPr>
+        <p:txBody>
+          <a:bodyPr wrap="square" rtlCol="0">
+            <a:spAutoFit/>
+          </a:bodyPr>
+          <a:lstStyle/>
+          <a:p>
+            <a:r>
+              <a:rPr lang="en-US" b="1" dirty="0" smtClean="0"/>
+              <a:t>L</a:t>
+            </a:r>
+            <a:r>
+              <a:rPr lang="en-US" b="1" baseline="-25000" dirty="0" smtClean="0"/>
+              <a:t>3</a:t>
+            </a:r>
+            <a:endParaRPr lang="en-US" b="1" baseline="-25000" dirty="0"/>
+          </a:p>
+        </p:txBody>
+      </p:sp>
+      <p:sp>
+        <p:nvSpPr>
+          <p:cNvPr id="57" name="TextBox 56"/>
+          <p:cNvSpPr txBox="1"/>
+          <p:nvPr/>
+        </p:nvSpPr>
+        <p:spPr>
+          <a:xfrm>
+            <a:off x="6194879" y="2793642"/>
+            <a:ext cx="520700" cy="369332"/>
+          </a:xfrm>
+          <a:prstGeom prst="rect">
+            <a:avLst/>
+          </a:prstGeom>
+          <a:noFill/>
+          <a:ln>
+            <a:noFill/>
+          </a:ln>
+        </p:spPr>
+        <p:txBody>
+          <a:bodyPr wrap="square" rtlCol="0">
+            <a:spAutoFit/>
+          </a:bodyPr>
+          <a:lstStyle/>
+          <a:p>
+            <a:r>
+              <a:rPr lang="en-US" b="1" dirty="0" smtClean="0"/>
+              <a:t>L</a:t>
+            </a:r>
+            <a:r>
+              <a:rPr lang="en-US" b="1" baseline="-25000" dirty="0"/>
+              <a:t>4</a:t>
+            </a:r>
+          </a:p>
+        </p:txBody>
+      </p:sp>
+      <p:cxnSp>
+        <p:nvCxnSpPr>
+          <p:cNvPr id="4" name="Straight Arrow Connector 3"/>
+          <p:cNvCxnSpPr/>
+          <p:nvPr/>
+        </p:nvCxnSpPr>
+        <p:spPr>
+          <a:xfrm>
+            <a:off x="4673158" y="2784990"/>
+            <a:ext cx="622742" cy="217722"/>
+          </a:xfrm>
+          <a:prstGeom prst="straightConnector1">
+            <a:avLst/>
+          </a:prstGeom>
+          <a:ln w="28575">
+            <a:solidFill>
+              <a:schemeClr val="tx1"/>
+            </a:solidFill>
+            <a:tailEnd type="triangle"/>
+          </a:ln>
+        </p:spPr>
+        <p:style>
+          <a:lnRef idx="1">
+            <a:schemeClr val="accent1"/>
+          </a:lnRef>
+          <a:fillRef idx="0">
+            <a:schemeClr val="accent1"/>
+          </a:fillRef>
+          <a:effectRef idx="0">
+            <a:schemeClr val="accent1"/>
+          </a:effectRef>
+          <a:fontRef idx="minor">
+            <a:schemeClr val="tx1"/>
+          </a:fontRef>
+        </p:style>
+      </p:cxnSp>
+      <p:cxnSp>
+        <p:nvCxnSpPr>
+          <p:cNvPr id="59" name="Straight Arrow Connector 58"/>
+          <p:cNvCxnSpPr/>
+          <p:nvPr/>
+        </p:nvCxnSpPr>
+        <p:spPr>
+          <a:xfrm flipH="1" flipV="1">
+            <a:off x="3454401" y="2311400"/>
+            <a:ext cx="705446" cy="254511"/>
+          </a:xfrm>
+          <a:prstGeom prst="straightConnector1">
+            <a:avLst/>
+          </a:prstGeom>
+          <a:ln w="28575">
+            <a:solidFill>
+              <a:schemeClr val="tx1"/>
+            </a:solidFill>
+            <a:tailEnd type="triangle"/>
+          </a:ln>
+        </p:spPr>
+        <p:style>
+          <a:lnRef idx="1">
+            <a:schemeClr val="accent1"/>
+          </a:lnRef>
+          <a:fillRef idx="0">
+            <a:schemeClr val="accent1"/>
+          </a:fillRef>
+          <a:effectRef idx="0">
+            <a:schemeClr val="accent1"/>
+          </a:effectRef>
+          <a:fontRef idx="minor">
+            <a:schemeClr val="tx1"/>
+          </a:fontRef>
+        </p:style>
+      </p:cxnSp>
+      <p:cxnSp>
+        <p:nvCxnSpPr>
+          <p:cNvPr id="60" name="Straight Arrow Connector 59"/>
+          <p:cNvCxnSpPr/>
+          <p:nvPr/>
+        </p:nvCxnSpPr>
+        <p:spPr>
+          <a:xfrm>
+            <a:off x="5574162" y="2290529"/>
+            <a:ext cx="143655" cy="643350"/>
+          </a:xfrm>
+          <a:prstGeom prst="straightConnector1">
+            <a:avLst/>
+          </a:prstGeom>
+          <a:ln w="28575">
+            <a:solidFill>
+              <a:schemeClr val="tx1"/>
+            </a:solidFill>
+            <a:tailEnd type="triangle"/>
+          </a:ln>
+        </p:spPr>
+        <p:style>
+          <a:lnRef idx="1">
+            <a:schemeClr val="accent1"/>
+          </a:lnRef>
+          <a:fillRef idx="0">
+            <a:schemeClr val="accent1"/>
+          </a:fillRef>
+          <a:effectRef idx="0">
+            <a:schemeClr val="accent1"/>
+          </a:effectRef>
+          <a:fontRef idx="minor">
+            <a:schemeClr val="tx1"/>
+          </a:fontRef>
+        </p:style>
+      </p:cxnSp>
+      <p:cxnSp>
+        <p:nvCxnSpPr>
+          <p:cNvPr id="62" name="Straight Arrow Connector 61"/>
+          <p:cNvCxnSpPr/>
+          <p:nvPr/>
+        </p:nvCxnSpPr>
+        <p:spPr>
+          <a:xfrm flipH="1">
+            <a:off x="5852727" y="1974692"/>
+            <a:ext cx="1080621" cy="858766"/>
+          </a:xfrm>
+          <a:prstGeom prst="straightConnector1">
+            <a:avLst/>
+          </a:prstGeom>
+          <a:ln w="28575">
+            <a:solidFill>
+              <a:schemeClr val="tx1"/>
+            </a:solidFill>
+            <a:tailEnd type="triangle"/>
+          </a:ln>
+        </p:spPr>
+        <p:style>
+          <a:lnRef idx="1">
+            <a:schemeClr val="accent1"/>
+          </a:lnRef>
+          <a:fillRef idx="0">
+            <a:schemeClr val="accent1"/>
+          </a:fillRef>
+          <a:effectRef idx="0">
+            <a:schemeClr val="accent1"/>
+          </a:effectRef>
+          <a:fontRef idx="minor">
+            <a:schemeClr val="tx1"/>
+          </a:fontRef>
+        </p:style>
+      </p:cxnSp>
+      <p:cxnSp>
+        <p:nvCxnSpPr>
+          <p:cNvPr id="63" name="Straight Arrow Connector 62"/>
+          <p:cNvCxnSpPr/>
+          <p:nvPr/>
+        </p:nvCxnSpPr>
+        <p:spPr>
+          <a:xfrm flipH="1">
+            <a:off x="5797708" y="3139991"/>
+            <a:ext cx="393573" cy="237657"/>
+          </a:xfrm>
+          <a:prstGeom prst="straightConnector1">
+            <a:avLst/>
+          </a:prstGeom>
+          <a:ln w="28575">
+            <a:solidFill>
+              <a:schemeClr val="tx1"/>
+            </a:solidFill>
+            <a:tailEnd type="triangle"/>
+          </a:ln>
+        </p:spPr>
+        <p:style>
+          <a:lnRef idx="1">
+            <a:schemeClr val="accent1"/>
+          </a:lnRef>
+          <a:fillRef idx="0">
+            <a:schemeClr val="accent1"/>
+          </a:fillRef>
+          <a:effectRef idx="0">
+            <a:schemeClr val="accent1"/>
+          </a:effectRef>
+          <a:fontRef idx="minor">
+            <a:schemeClr val="tx1"/>
+          </a:fontRef>
+        </p:style>
+      </p:cxnSp>
+      <p:cxnSp>
+        <p:nvCxnSpPr>
+          <p:cNvPr id="69" name="Straight Arrow Connector 68"/>
+          <p:cNvCxnSpPr/>
+          <p:nvPr/>
+        </p:nvCxnSpPr>
+        <p:spPr>
+          <a:xfrm flipH="1" flipV="1">
+            <a:off x="5351642" y="1205948"/>
+            <a:ext cx="135201" cy="618610"/>
+          </a:xfrm>
+          <a:prstGeom prst="straightConnector1">
+            <a:avLst/>
+          </a:prstGeom>
+          <a:ln w="28575">
+            <a:solidFill>
+              <a:schemeClr val="tx1"/>
+            </a:solidFill>
+            <a:tailEnd type="triangle"/>
+          </a:ln>
+        </p:spPr>
+        <p:style>
+          <a:lnRef idx="1">
+            <a:schemeClr val="accent1"/>
+          </a:lnRef>
+          <a:fillRef idx="0">
+            <a:schemeClr val="accent1"/>
+          </a:fillRef>
+          <a:effectRef idx="0">
+            <a:schemeClr val="accent1"/>
+          </a:effectRef>
+          <a:fontRef idx="minor">
+            <a:schemeClr val="tx1"/>
+          </a:fontRef>
+        </p:style>
+      </p:cxnSp>
+      <p:cxnSp>
+        <p:nvCxnSpPr>
+          <p:cNvPr id="72" name="Straight Arrow Connector 71"/>
+          <p:cNvCxnSpPr/>
+          <p:nvPr/>
+        </p:nvCxnSpPr>
+        <p:spPr>
+          <a:xfrm flipV="1">
+            <a:off x="7297628" y="1122126"/>
+            <a:ext cx="743789" cy="549223"/>
+          </a:xfrm>
+          <a:prstGeom prst="straightConnector1">
+            <a:avLst/>
+          </a:prstGeom>
+          <a:ln w="28575">
+            <a:solidFill>
+              <a:schemeClr val="tx1"/>
+            </a:solidFill>
+            <a:tailEnd type="triangle"/>
+          </a:ln>
+        </p:spPr>
+        <p:style>
+          <a:lnRef idx="1">
+            <a:schemeClr val="accent1"/>
+          </a:lnRef>
+          <a:fillRef idx="0">
+            <a:schemeClr val="accent1"/>
+          </a:fillRef>
+          <a:effectRef idx="0">
+            <a:schemeClr val="accent1"/>
+          </a:effectRef>
+          <a:fontRef idx="minor">
+            <a:schemeClr val="tx1"/>
+          </a:fontRef>
+        </p:style>
+      </p:cxnSp>
+      <p:cxnSp>
+        <p:nvCxnSpPr>
+          <p:cNvPr id="75" name="Straight Arrow Connector 74"/>
+          <p:cNvCxnSpPr/>
+          <p:nvPr/>
+        </p:nvCxnSpPr>
+        <p:spPr>
+          <a:xfrm flipV="1">
+            <a:off x="6475817" y="2679894"/>
+            <a:ext cx="332236" cy="248125"/>
+          </a:xfrm>
+          <a:prstGeom prst="straightConnector1">
+            <a:avLst/>
+          </a:prstGeom>
+          <a:ln w="28575">
+            <a:solidFill>
+              <a:schemeClr val="tx1"/>
+            </a:solidFill>
+            <a:tailEnd type="triangle"/>
+          </a:ln>
+        </p:spPr>
+        <p:style>
+          <a:lnRef idx="1">
+            <a:schemeClr val="accent1"/>
+          </a:lnRef>
+          <a:fillRef idx="0">
+            <a:schemeClr val="accent1"/>
+          </a:fillRef>
+          <a:effectRef idx="0">
+            <a:schemeClr val="accent1"/>
+          </a:effectRef>
+          <a:fontRef idx="minor">
+            <a:schemeClr val="tx1"/>
+          </a:fontRef>
+        </p:style>
+      </p:cxnSp>
+      <p:sp>
+        <p:nvSpPr>
+          <p:cNvPr id="38" name="TextBox 37"/>
+          <p:cNvSpPr txBox="1"/>
+          <p:nvPr/>
+        </p:nvSpPr>
+        <p:spPr>
+          <a:xfrm>
+            <a:off x="2832100" y="2552965"/>
+            <a:ext cx="474841" cy="369332"/>
+          </a:xfrm>
+          <a:prstGeom prst="rect">
+            <a:avLst/>
+          </a:prstGeom>
+          <a:noFill/>
+        </p:spPr>
+        <p:txBody>
+          <a:bodyPr wrap="square" rtlCol="0">
+            <a:spAutoFit/>
+          </a:bodyPr>
+          <a:lstStyle/>
+          <a:p>
+            <a:r>
+              <a:rPr lang="en-US" b="1" dirty="0" smtClean="0"/>
+              <a:t>P</a:t>
+            </a:r>
+            <a:r>
+              <a:rPr lang="en-US" b="1" baseline="-25000" dirty="0" smtClean="0"/>
+              <a:t>1</a:t>
+            </a:r>
+            <a:endParaRPr lang="en-US" b="1" baseline="-25000" dirty="0"/>
+          </a:p>
+        </p:txBody>
+      </p:sp>
+      <p:sp>
+        <p:nvSpPr>
+          <p:cNvPr id="78" name="TextBox 77"/>
+          <p:cNvSpPr txBox="1"/>
+          <p:nvPr/>
+        </p:nvSpPr>
+        <p:spPr>
+          <a:xfrm>
+            <a:off x="4750548" y="748892"/>
+            <a:ext cx="474841" cy="369332"/>
+          </a:xfrm>
+          <a:prstGeom prst="rect">
+            <a:avLst/>
+          </a:prstGeom>
+          <a:noFill/>
+        </p:spPr>
+        <p:txBody>
+          <a:bodyPr wrap="square" rtlCol="0">
+            <a:spAutoFit/>
+          </a:bodyPr>
+          <a:lstStyle/>
+          <a:p>
+            <a:r>
+              <a:rPr lang="en-US" b="1" dirty="0" smtClean="0"/>
+              <a:t>P</a:t>
+            </a:r>
+            <a:r>
+              <a:rPr lang="en-US" b="1" baseline="-25000" dirty="0" smtClean="0"/>
+              <a:t>2</a:t>
+            </a:r>
+            <a:endParaRPr lang="en-US" b="1" baseline="-25000" dirty="0"/>
+          </a:p>
+        </p:txBody>
+      </p:sp>
+      <p:sp>
+        <p:nvSpPr>
+          <p:cNvPr id="79" name="TextBox 78"/>
+          <p:cNvSpPr txBox="1"/>
+          <p:nvPr/>
+        </p:nvSpPr>
+        <p:spPr>
+          <a:xfrm>
+            <a:off x="8077948" y="558799"/>
+            <a:ext cx="474841" cy="369332"/>
+          </a:xfrm>
+          <a:prstGeom prst="rect">
+            <a:avLst/>
+          </a:prstGeom>
+          <a:noFill/>
+        </p:spPr>
+        <p:txBody>
+          <a:bodyPr wrap="square" rtlCol="0">
+            <a:spAutoFit/>
+          </a:bodyPr>
+          <a:lstStyle/>
+          <a:p>
+            <a:r>
+              <a:rPr lang="en-US" b="1" dirty="0" smtClean="0"/>
+              <a:t>P</a:t>
+            </a:r>
+            <a:r>
+              <a:rPr lang="en-US" b="1" baseline="-25000" dirty="0" smtClean="0"/>
+              <a:t>3</a:t>
+            </a:r>
+            <a:endParaRPr lang="en-US" b="1" baseline="-25000" dirty="0"/>
+          </a:p>
+        </p:txBody>
+      </p:sp>
+      <p:sp>
+        <p:nvSpPr>
+          <p:cNvPr id="80" name="TextBox 79"/>
+          <p:cNvSpPr txBox="1"/>
+          <p:nvPr/>
+        </p:nvSpPr>
+        <p:spPr>
+          <a:xfrm>
+            <a:off x="7064018" y="2511745"/>
+            <a:ext cx="474841" cy="369332"/>
+          </a:xfrm>
+          <a:prstGeom prst="rect">
+            <a:avLst/>
+          </a:prstGeom>
+          <a:noFill/>
+        </p:spPr>
+        <p:txBody>
+          <a:bodyPr wrap="square" rtlCol="0">
+            <a:spAutoFit/>
+          </a:bodyPr>
+          <a:lstStyle/>
+          <a:p>
+            <a:r>
+              <a:rPr lang="en-US" b="1" dirty="0" smtClean="0"/>
+              <a:t>P</a:t>
+            </a:r>
+            <a:r>
+              <a:rPr lang="en-US" b="1" baseline="-25000" dirty="0" smtClean="0"/>
+              <a:t>4</a:t>
+            </a:r>
+            <a:endParaRPr lang="en-US" b="1" baseline="-25000" dirty="0"/>
+          </a:p>
+        </p:txBody>
+      </p:sp>
     </p:spTree>
     <p:extLst>
       <p:ext uri="{BB962C8B-B14F-4D97-AF65-F5344CB8AC3E}">

</xml_diff>